<commit_message>
made edits to ppt
</commit_message>
<xml_diff>
--- a/Presentation/Project3_Sharmila&Sumitha&Russ.pptx
+++ b/Presentation/Project3_Sharmila&Sumitha&Russ.pptx
@@ -7546,15 +7546,7 @@
           <a:p>
             <a:r>
               <a:rPr lang="en-US" dirty="0"/>
-              <a:t>“Predict Rent” button </a:t>
-            </a:r>
-            <a:r>
-              <a:rPr lang="en-US" dirty="0" err="1"/>
-              <a:t>valls</a:t>
-            </a:r>
-            <a:r>
-              <a:rPr lang="en-US" dirty="0"/>
-              <a:t> app.py</a:t>
+              <a:t>“Predict Rent” button calls app.py</a:t>
             </a:r>
           </a:p>
           <a:p>
@@ -9015,13 +9007,13 @@
   <p:clrMapOvr>
     <a:masterClrMapping/>
   </p:clrMapOvr>
-  <mc:AlternateContent xmlns:mc="http://schemas.openxmlformats.org/markup-compatibility/2006">
-    <mc:Choice xmlns:p14="http://schemas.microsoft.com/office/powerpoint/2010/main" Requires="p14">
+  <mc:AlternateContent xmlns:mc="http://schemas.openxmlformats.org/markup-compatibility/2006" xmlns:p14="http://schemas.microsoft.com/office/powerpoint/2010/main">
+    <mc:Choice Requires="p14">
       <p:transition spd="med" p14:dur="700">
         <p:fade/>
       </p:transition>
     </mc:Choice>
-    <mc:Fallback>
+    <mc:Fallback xmlns="">
       <p:transition spd="med">
         <p:fade/>
       </p:transition>
@@ -10942,13 +10934,13 @@
   <p:clrMapOvr>
     <a:masterClrMapping/>
   </p:clrMapOvr>
-  <mc:AlternateContent xmlns:mc="http://schemas.openxmlformats.org/markup-compatibility/2006">
-    <mc:Choice xmlns:p14="http://schemas.microsoft.com/office/powerpoint/2010/main" Requires="p14">
+  <mc:AlternateContent xmlns:mc="http://schemas.openxmlformats.org/markup-compatibility/2006" xmlns:p14="http://schemas.microsoft.com/office/powerpoint/2010/main">
+    <mc:Choice Requires="p14">
       <p:transition spd="med" p14:dur="700">
         <p:fade/>
       </p:transition>
     </mc:Choice>
-    <mc:Fallback>
+    <mc:Fallback xmlns="">
       <p:transition spd="med">
         <p:fade/>
       </p:transition>

</xml_diff>